<commit_message>
copied improvements form nao_nocv_2_0 to nao_2_0
</commit_message>
<xml_diff>
--- a/Manual nao-lib.pptx
+++ b/Manual nao-lib.pptx
@@ -193,14 +193,14 @@
           </a:ln>
           <a:extLst>
             <a:ext uri="{909E8E84-426E-40dd-AFC4-6F175D3DCCD1}">
-              <a14:hiddenFill xmlns:a14="http://schemas.microsoft.com/office/drawing/2010/main" xmlns="">
+              <a14:hiddenFill xmlns="" xmlns:a14="http://schemas.microsoft.com/office/drawing/2010/main">
                 <a:solidFill>
                   <a:srgbClr val="FFFFFF"/>
                 </a:solidFill>
               </a14:hiddenFill>
             </a:ext>
             <a:ext uri="{91240B29-F687-4f45-9708-019B960494DF}">
-              <a14:hiddenLine xmlns:a14="http://schemas.microsoft.com/office/drawing/2010/main" xmlns="" w="9525">
+              <a14:hiddenLine xmlns="" xmlns:a14="http://schemas.microsoft.com/office/drawing/2010/main" w="9525">
                 <a:solidFill>
                   <a:srgbClr val="000000"/>
                 </a:solidFill>
@@ -247,14 +247,14 @@
           </a:ln>
           <a:extLst>
             <a:ext uri="{909E8E84-426E-40dd-AFC4-6F175D3DCCD1}">
-              <a14:hiddenFill xmlns:a14="http://schemas.microsoft.com/office/drawing/2010/main" xmlns="">
+              <a14:hiddenFill xmlns="" xmlns:a14="http://schemas.microsoft.com/office/drawing/2010/main">
                 <a:solidFill>
                   <a:srgbClr val="FFFFFF"/>
                 </a:solidFill>
               </a14:hiddenFill>
             </a:ext>
             <a:ext uri="{91240B29-F687-4f45-9708-019B960494DF}">
-              <a14:hiddenLine xmlns:a14="http://schemas.microsoft.com/office/drawing/2010/main" xmlns="" w="9525">
+              <a14:hiddenLine xmlns="" xmlns:a14="http://schemas.microsoft.com/office/drawing/2010/main" w="9525">
                 <a:solidFill>
                   <a:srgbClr val="000000"/>
                 </a:solidFill>
@@ -535,7 +535,7 @@
                 </a:solidFill>
               </a:rPr>
               <a:pPr/>
-              <a:t>6/2/2017</a:t>
+              <a:t>4/26/2018</a:t>
             </a:fld>
             <a:endParaRPr lang="en-US" altLang="en-US">
               <a:solidFill>
@@ -774,7 +774,7 @@
                 </a:solidFill>
               </a:rPr>
               <a:pPr/>
-              <a:t>6/2/2017</a:t>
+              <a:t>4/26/2018</a:t>
             </a:fld>
             <a:endParaRPr lang="en-US" altLang="en-US">
               <a:solidFill>
@@ -1105,7 +1105,7 @@
                 </a:solidFill>
               </a:rPr>
               <a:pPr/>
-              <a:t>6/2/2017</a:t>
+              <a:t>4/26/2018</a:t>
             </a:fld>
             <a:endParaRPr lang="en-US" altLang="en-US">
               <a:solidFill>
@@ -1571,7 +1571,7 @@
                 </a:solidFill>
               </a:rPr>
               <a:pPr/>
-              <a:t>6/2/2017</a:t>
+              <a:t>4/26/2018</a:t>
             </a:fld>
             <a:endParaRPr lang="en-US" altLang="en-US">
               <a:solidFill>
@@ -1732,7 +1732,7 @@
                 </a:solidFill>
               </a:rPr>
               <a:pPr/>
-              <a:t>6/2/2017</a:t>
+              <a:t>4/26/2018</a:t>
             </a:fld>
             <a:endParaRPr lang="en-US" altLang="en-US">
               <a:solidFill>
@@ -1870,7 +1870,7 @@
                 </a:solidFill>
               </a:rPr>
               <a:pPr/>
-              <a:t>6/2/2017</a:t>
+              <a:t>4/26/2018</a:t>
             </a:fld>
             <a:endParaRPr lang="en-US" altLang="en-US">
               <a:solidFill>
@@ -2029,7 +2029,7 @@
                 </a:solidFill>
               </a:rPr>
               <a:pPr/>
-              <a:t>6/2/2017</a:t>
+              <a:t>4/26/2018</a:t>
             </a:fld>
             <a:endParaRPr lang="en-US" altLang="en-US">
               <a:solidFill>
@@ -2153,14 +2153,14 @@
           </a:ln>
           <a:extLst>
             <a:ext uri="{909E8E84-426E-40dd-AFC4-6F175D3DCCD1}">
-              <a14:hiddenFill xmlns:a14="http://schemas.microsoft.com/office/drawing/2010/main" xmlns="">
+              <a14:hiddenFill xmlns="" xmlns:a14="http://schemas.microsoft.com/office/drawing/2010/main">
                 <a:solidFill>
                   <a:srgbClr val="FFFFFF"/>
                 </a:solidFill>
               </a14:hiddenFill>
             </a:ext>
             <a:ext uri="{91240B29-F687-4f45-9708-019B960494DF}">
-              <a14:hiddenLine xmlns:a14="http://schemas.microsoft.com/office/drawing/2010/main" xmlns="" w="9525">
+              <a14:hiddenLine xmlns="" xmlns:a14="http://schemas.microsoft.com/office/drawing/2010/main" w="9525">
                 <a:solidFill>
                   <a:srgbClr val="000000"/>
                 </a:solidFill>
@@ -2196,14 +2196,14 @@
           </a:ln>
           <a:extLst>
             <a:ext uri="{909E8E84-426E-40dd-AFC4-6F175D3DCCD1}">
-              <a14:hiddenFill xmlns:a14="http://schemas.microsoft.com/office/drawing/2010/main" xmlns="">
+              <a14:hiddenFill xmlns="" xmlns:a14="http://schemas.microsoft.com/office/drawing/2010/main">
                 <a:solidFill>
                   <a:srgbClr val="FFFFFF"/>
                 </a:solidFill>
               </a14:hiddenFill>
             </a:ext>
             <a:ext uri="{91240B29-F687-4f45-9708-019B960494DF}">
-              <a14:hiddenLine xmlns:a14="http://schemas.microsoft.com/office/drawing/2010/main" xmlns="" w="9525">
+              <a14:hiddenLine xmlns="" xmlns:a14="http://schemas.microsoft.com/office/drawing/2010/main" w="9525">
                 <a:solidFill>
                   <a:srgbClr val="000000"/>
                 </a:solidFill>
@@ -2405,14 +2405,14 @@
           </a:ln>
           <a:extLst>
             <a:ext uri="{909E8E84-426E-40dd-AFC4-6F175D3DCCD1}">
-              <a14:hiddenFill xmlns:a14="http://schemas.microsoft.com/office/drawing/2010/main" xmlns="">
+              <a14:hiddenFill xmlns="" xmlns:a14="http://schemas.microsoft.com/office/drawing/2010/main">
                 <a:solidFill>
                   <a:srgbClr val="FFFFFF"/>
                 </a:solidFill>
               </a14:hiddenFill>
             </a:ext>
             <a:ext uri="{91240B29-F687-4f45-9708-019B960494DF}">
-              <a14:hiddenLine xmlns:a14="http://schemas.microsoft.com/office/drawing/2010/main" xmlns="" w="9525">
+              <a14:hiddenLine xmlns="" xmlns:a14="http://schemas.microsoft.com/office/drawing/2010/main" w="9525">
                 <a:solidFill>
                   <a:srgbClr val="000000"/>
                 </a:solidFill>
@@ -2492,7 +2492,7 @@
                   <a:spcPct val="0"/>
                 </a:spcAft>
               </a:pPr>
-              <a:t>6/2/2017</a:t>
+              <a:t>4/26/2018</a:t>
             </a:fld>
             <a:endParaRPr lang="en-US" altLang="en-US">
               <a:solidFill>
@@ -2528,14 +2528,14 @@
           </a:ln>
           <a:extLst>
             <a:ext uri="{909E8E84-426E-40dd-AFC4-6F175D3DCCD1}">
-              <a14:hiddenFill xmlns:a14="http://schemas.microsoft.com/office/drawing/2010/main" xmlns="">
+              <a14:hiddenFill xmlns="" xmlns:a14="http://schemas.microsoft.com/office/drawing/2010/main">
                 <a:solidFill>
                   <a:srgbClr val="FFFFFF"/>
                 </a:solidFill>
               </a14:hiddenFill>
             </a:ext>
             <a:ext uri="{91240B29-F687-4f45-9708-019B960494DF}">
-              <a14:hiddenLine xmlns:a14="http://schemas.microsoft.com/office/drawing/2010/main" xmlns="" w="9525">
+              <a14:hiddenLine xmlns="" xmlns:a14="http://schemas.microsoft.com/office/drawing/2010/main" w="9525">
                 <a:solidFill>
                   <a:srgbClr val="000000"/>
                 </a:solidFill>
@@ -5655,11 +5655,7 @@
           <a:p>
             <a:r>
               <a:rPr lang="en-US" dirty="0" smtClean="0"/>
-              <a:t>The first row contains text </a:t>
-            </a:r>
-            <a:r>
-              <a:rPr lang="en-US" dirty="0" smtClean="0"/>
-              <a:t>labels</a:t>
+              <a:t>The first row contains text labels</a:t>
             </a:r>
           </a:p>
           <a:p>
@@ -5719,12 +5715,16 @@
               <a:t>Frequency is the frequency in Hz; 0 is </a:t>
             </a:r>
             <a:r>
-              <a:rPr lang="en-US" sz="1800" dirty="0" err="1" smtClean="0"/>
-              <a:t>sontinuously</a:t>
+              <a:rPr lang="en-US" sz="1800" dirty="0"/>
+              <a:t>c</a:t>
             </a:r>
             <a:r>
               <a:rPr lang="en-US" sz="1800" dirty="0" smtClean="0"/>
-              <a:t> on</a:t>
+              <a:t>ontinuously </a:t>
+            </a:r>
+            <a:r>
+              <a:rPr lang="en-US" sz="1800" dirty="0" smtClean="0"/>
+              <a:t>on</a:t>
             </a:r>
           </a:p>
           <a:p>

</xml_diff>